<commit_message>
new slides and demos
</commit_message>
<xml_diff>
--- a/assets/ppt/cfg/cfg2-ambiguity.pptx
+++ b/assets/ppt/cfg/cfg2-ambiguity.pptx
@@ -5,10 +5,10 @@
     <p:sldMasterId id="2147483672" r:id="rId1"/>
   </p:sldMasterIdLst>
   <p:notesMasterIdLst>
-    <p:notesMasterId r:id="rId21"/>
+    <p:notesMasterId r:id="rId22"/>
   </p:notesMasterIdLst>
   <p:handoutMasterIdLst>
-    <p:handoutMasterId r:id="rId22"/>
+    <p:handoutMasterId r:id="rId23"/>
   </p:handoutMasterIdLst>
   <p:sldIdLst>
     <p:sldId id="336" r:id="rId2"/>
@@ -30,6 +30,7 @@
     <p:sldId id="338" r:id="rId18"/>
     <p:sldId id="339" r:id="rId19"/>
     <p:sldId id="340" r:id="rId20"/>
+    <p:sldId id="341" r:id="rId21"/>
   </p:sldIdLst>
   <p:sldSz cx="9144000" cy="6858000" type="screen4x3"/>
   <p:notesSz cx="6858000" cy="9144000"/>
@@ -961,10 +962,10 @@
           <a:bodyPr/>
           <a:lstStyle/>
           <a:p>
-            <a:fld id="{4DDBCF34-22C1-CA47-B25B-EF8B1BAC838B}" type="slidenum">
+            <a:fld id="{D6EF7010-A84E-704E-888E-925FF3BC72A8}" type="slidenum">
               <a:rPr lang="en-US"/>
               <a:pPr/>
-              <a:t>17</a:t>
+              <a:t>16</a:t>
             </a:fld>
             <a:endParaRPr lang="en-US"/>
           </a:p>
@@ -972,7 +973,7 @@
       </p:sp>
       <p:sp>
         <p:nvSpPr>
-          <p:cNvPr id="133122" name="Rectangle 2"/>
+          <p:cNvPr id="116738" name="Rectangle 2"/>
           <p:cNvSpPr>
             <a:spLocks noGrp="1" noRot="1" noChangeAspect="1" noChangeArrowheads="1" noTextEdit="1"/>
           </p:cNvSpPr>
@@ -986,7 +987,7 @@
       </p:sp>
       <p:sp>
         <p:nvSpPr>
-          <p:cNvPr id="133123" name="Rectangle 3"/>
+          <p:cNvPr id="116739" name="Rectangle 3"/>
           <p:cNvSpPr>
             <a:spLocks noGrp="1" noChangeArrowheads="1"/>
           </p:cNvSpPr>
@@ -1045,6 +1046,90 @@
           <a:bodyPr/>
           <a:lstStyle/>
           <a:p>
+            <a:fld id="{4DDBCF34-22C1-CA47-B25B-EF8B1BAC838B}" type="slidenum">
+              <a:rPr lang="en-US"/>
+              <a:pPr/>
+              <a:t>17</a:t>
+            </a:fld>
+            <a:endParaRPr lang="en-US"/>
+          </a:p>
+        </p:txBody>
+      </p:sp>
+      <p:sp>
+        <p:nvSpPr>
+          <p:cNvPr id="133122" name="Rectangle 2"/>
+          <p:cNvSpPr>
+            <a:spLocks noGrp="1" noRot="1" noChangeAspect="1" noChangeArrowheads="1" noTextEdit="1"/>
+          </p:cNvSpPr>
+          <p:nvPr>
+            <p:ph type="sldImg"/>
+          </p:nvPr>
+        </p:nvSpPr>
+        <p:spPr>
+          <a:ln/>
+        </p:spPr>
+      </p:sp>
+      <p:sp>
+        <p:nvSpPr>
+          <p:cNvPr id="133123" name="Rectangle 3"/>
+          <p:cNvSpPr>
+            <a:spLocks noGrp="1" noChangeArrowheads="1"/>
+          </p:cNvSpPr>
+          <p:nvPr>
+            <p:ph type="body" idx="1"/>
+          </p:nvPr>
+        </p:nvSpPr>
+        <p:spPr/>
+        <p:txBody>
+          <a:bodyPr/>
+          <a:lstStyle/>
+          <a:p>
+            <a:endParaRPr lang="en-US"/>
+          </a:p>
+        </p:txBody>
+      </p:sp>
+    </p:spTree>
+  </p:cSld>
+  <p:clrMapOvr>
+    <a:masterClrMapping/>
+  </p:clrMapOvr>
+</p:notes>
+</file>
+
+<file path=ppt/notesSlides/notesSlide12.xml><?xml version="1.0" encoding="utf-8"?>
+<p:notes xmlns:a="http://schemas.openxmlformats.org/drawingml/2006/main" xmlns:r="http://schemas.openxmlformats.org/officeDocument/2006/relationships" xmlns:p="http://schemas.openxmlformats.org/presentationml/2006/main">
+  <p:cSld>
+    <p:spTree>
+      <p:nvGrpSpPr>
+        <p:cNvPr id="1" name=""/>
+        <p:cNvGrpSpPr/>
+        <p:nvPr/>
+      </p:nvGrpSpPr>
+      <p:grpSpPr>
+        <a:xfrm>
+          <a:off x="0" y="0"/>
+          <a:ext cx="0" cy="0"/>
+          <a:chOff x="0" y="0"/>
+          <a:chExt cx="0" cy="0"/>
+        </a:xfrm>
+      </p:grpSpPr>
+      <p:sp>
+        <p:nvSpPr>
+          <p:cNvPr id="7" name="Rectangle 7"/>
+          <p:cNvSpPr>
+            <a:spLocks noGrp="1" noChangeArrowheads="1"/>
+          </p:cNvSpPr>
+          <p:nvPr>
+            <p:ph type="sldNum" sz="quarter" idx="5"/>
+          </p:nvPr>
+        </p:nvSpPr>
+        <p:spPr>
+          <a:ln/>
+        </p:spPr>
+        <p:txBody>
+          <a:bodyPr/>
+          <a:lstStyle/>
+          <a:p>
             <a:fld id="{A276793D-F3F2-9C41-AFC3-173DDA81DB9B}" type="slidenum">
               <a:rPr lang="en-US"/>
               <a:pPr/>
@@ -1095,7 +1180,7 @@
 </p:notes>
 </file>
 
-<file path=ppt/notesSlides/notesSlide12.xml><?xml version="1.0" encoding="utf-8"?>
+<file path=ppt/notesSlides/notesSlide13.xml><?xml version="1.0" encoding="utf-8"?>
 <p:notes xmlns:a="http://schemas.openxmlformats.org/drawingml/2006/main" xmlns:r="http://schemas.openxmlformats.org/officeDocument/2006/relationships" xmlns:p="http://schemas.openxmlformats.org/presentationml/2006/main">
   <p:cSld>
     <p:spTree>
@@ -1219,6 +1304,95 @@
 </p:notes>
 </file>
 
+<file path=ppt/notesSlides/notesSlide14.xml><?xml version="1.0" encoding="utf-8"?>
+<p:notes xmlns:a="http://schemas.openxmlformats.org/drawingml/2006/main" xmlns:r="http://schemas.openxmlformats.org/officeDocument/2006/relationships" xmlns:p="http://schemas.openxmlformats.org/presentationml/2006/main">
+  <p:cSld>
+    <p:spTree>
+      <p:nvGrpSpPr>
+        <p:cNvPr id="1" name=""/>
+        <p:cNvGrpSpPr/>
+        <p:nvPr/>
+      </p:nvGrpSpPr>
+      <p:grpSpPr>
+        <a:xfrm>
+          <a:off x="0" y="0"/>
+          <a:ext cx="0" cy="0"/>
+          <a:chOff x="0" y="0"/>
+          <a:chExt cx="0" cy="0"/>
+        </a:xfrm>
+      </p:grpSpPr>
+      <p:sp>
+        <p:nvSpPr>
+          <p:cNvPr id="7" name="Rectangle 7"/>
+          <p:cNvSpPr>
+            <a:spLocks noGrp="1" noChangeArrowheads="1"/>
+          </p:cNvSpPr>
+          <p:nvPr>
+            <p:ph type="sldNum" sz="quarter" idx="5"/>
+          </p:nvPr>
+        </p:nvSpPr>
+        <p:spPr>
+          <a:ln/>
+        </p:spPr>
+        <p:txBody>
+          <a:bodyPr/>
+          <a:lstStyle/>
+          <a:p>
+            <a:fld id="{A276793D-F3F2-9C41-AFC3-173DDA81DB9B}" type="slidenum">
+              <a:rPr lang="en-US"/>
+              <a:pPr/>
+              <a:t>20</a:t>
+            </a:fld>
+            <a:endParaRPr lang="en-US"/>
+          </a:p>
+        </p:txBody>
+      </p:sp>
+      <p:sp>
+        <p:nvSpPr>
+          <p:cNvPr id="114690" name="Rectangle 2"/>
+          <p:cNvSpPr>
+            <a:spLocks noGrp="1" noRot="1" noChangeAspect="1" noChangeArrowheads="1" noTextEdit="1"/>
+          </p:cNvSpPr>
+          <p:nvPr>
+            <p:ph type="sldImg"/>
+          </p:nvPr>
+        </p:nvSpPr>
+        <p:spPr>
+          <a:ln/>
+        </p:spPr>
+      </p:sp>
+      <p:sp>
+        <p:nvSpPr>
+          <p:cNvPr id="114691" name="Rectangle 3"/>
+          <p:cNvSpPr>
+            <a:spLocks noGrp="1" noChangeArrowheads="1"/>
+          </p:cNvSpPr>
+          <p:nvPr>
+            <p:ph type="body" idx="1"/>
+          </p:nvPr>
+        </p:nvSpPr>
+        <p:spPr/>
+        <p:txBody>
+          <a:bodyPr/>
+          <a:lstStyle/>
+          <a:p>
+            <a:endParaRPr lang="en-US"/>
+          </a:p>
+        </p:txBody>
+      </p:sp>
+    </p:spTree>
+    <p:extLst>
+      <p:ext uri="{BB962C8B-B14F-4D97-AF65-F5344CB8AC3E}">
+        <p14:creationId xmlns:p14="http://schemas.microsoft.com/office/powerpoint/2010/main" val="3601190471"/>
+      </p:ext>
+    </p:extLst>
+  </p:cSld>
+  <p:clrMapOvr>
+    <a:masterClrMapping/>
+  </p:clrMapOvr>
+</p:notes>
+</file>
+
 <file path=ppt/notesSlides/notesSlide2.xml><?xml version="1.0" encoding="utf-8"?>
 <p:notes xmlns:a="http://schemas.openxmlformats.org/drawingml/2006/main" xmlns:r="http://schemas.openxmlformats.org/officeDocument/2006/relationships" xmlns:p="http://schemas.openxmlformats.org/presentationml/2006/main">
   <p:cSld>
@@ -1866,49 +2040,21 @@
       </p:grpSpPr>
       <p:sp>
         <p:nvSpPr>
-          <p:cNvPr id="7" name="Rectangle 7"/>
+          <p:cNvPr id="2" name="Slide Image Placeholder 1"/>
           <p:cNvSpPr>
-            <a:spLocks noGrp="1" noChangeArrowheads="1"/>
-          </p:cNvSpPr>
-          <p:nvPr>
-            <p:ph type="sldNum" sz="quarter" idx="5"/>
-          </p:nvPr>
-        </p:nvSpPr>
-        <p:spPr>
-          <a:ln/>
-        </p:spPr>
-        <p:txBody>
-          <a:bodyPr/>
-          <a:lstStyle/>
-          <a:p>
-            <a:fld id="{D6EF7010-A84E-704E-888E-925FF3BC72A8}" type="slidenum">
-              <a:rPr lang="en-US"/>
-              <a:pPr/>
-              <a:t>16</a:t>
-            </a:fld>
-            <a:endParaRPr lang="en-US"/>
-          </a:p>
-        </p:txBody>
-      </p:sp>
-      <p:sp>
-        <p:nvSpPr>
-          <p:cNvPr id="116738" name="Rectangle 2"/>
-          <p:cNvSpPr>
-            <a:spLocks noGrp="1" noRot="1" noChangeAspect="1" noChangeArrowheads="1" noTextEdit="1"/>
+            <a:spLocks noGrp="1" noRot="1" noChangeAspect="1"/>
           </p:cNvSpPr>
           <p:nvPr>
             <p:ph type="sldImg"/>
           </p:nvPr>
         </p:nvSpPr>
-        <p:spPr>
-          <a:ln/>
-        </p:spPr>
+        <p:spPr/>
       </p:sp>
       <p:sp>
         <p:nvSpPr>
-          <p:cNvPr id="116739" name="Rectangle 3"/>
+          <p:cNvPr id="3" name="Notes Placeholder 2"/>
           <p:cNvSpPr>
-            <a:spLocks noGrp="1" noChangeArrowheads="1"/>
+            <a:spLocks noGrp="1"/>
           </p:cNvSpPr>
           <p:nvPr>
             <p:ph type="body" idx="1"/>
@@ -1919,11 +2065,40 @@
           <a:bodyPr/>
           <a:lstStyle/>
           <a:p>
+            <a:endParaRPr lang="en-US" dirty="0"/>
+          </a:p>
+        </p:txBody>
+      </p:sp>
+      <p:sp>
+        <p:nvSpPr>
+          <p:cNvPr id="4" name="Slide Number Placeholder 3"/>
+          <p:cNvSpPr>
+            <a:spLocks noGrp="1"/>
+          </p:cNvSpPr>
+          <p:nvPr>
+            <p:ph type="sldNum" sz="quarter" idx="5"/>
+          </p:nvPr>
+        </p:nvSpPr>
+        <p:spPr/>
+        <p:txBody>
+          <a:bodyPr/>
+          <a:lstStyle/>
+          <a:p>
+            <a:fld id="{0145A6CB-08E3-524B-8C9B-64D562E3780A}" type="slidenum">
+              <a:rPr lang="en-US" smtClean="0"/>
+              <a:pPr/>
+              <a:t>12</a:t>
+            </a:fld>
             <a:endParaRPr lang="en-US"/>
           </a:p>
         </p:txBody>
       </p:sp>
     </p:spTree>
+    <p:extLst>
+      <p:ext uri="{BB962C8B-B14F-4D97-AF65-F5344CB8AC3E}">
+        <p14:creationId xmlns:p14="http://schemas.microsoft.com/office/powerpoint/2010/main" val="846573434"/>
+      </p:ext>
+    </p:extLst>
   </p:cSld>
   <p:clrMapOvr>
     <a:masterClrMapping/>
@@ -16810,6 +16985,768 @@
         </p:cTn>
       </p:par>
     </p:tnLst>
+  </p:timing>
+</p:sld>
+</file>
+
+<file path=ppt/slides/slide20.xml><?xml version="1.0" encoding="utf-8"?>
+<p:sld xmlns:a="http://schemas.openxmlformats.org/drawingml/2006/main" xmlns:r="http://schemas.openxmlformats.org/officeDocument/2006/relationships" xmlns:p="http://schemas.openxmlformats.org/presentationml/2006/main" showMasterPhAnim="0">
+  <p:cSld>
+    <p:spTree>
+      <p:nvGrpSpPr>
+        <p:cNvPr id="1" name=""/>
+        <p:cNvGrpSpPr/>
+        <p:nvPr/>
+      </p:nvGrpSpPr>
+      <p:grpSpPr>
+        <a:xfrm>
+          <a:off x="0" y="0"/>
+          <a:ext cx="0" cy="0"/>
+          <a:chOff x="0" y="0"/>
+          <a:chExt cx="0" cy="0"/>
+        </a:xfrm>
+      </p:grpSpPr>
+      <p:sp>
+        <p:nvSpPr>
+          <p:cNvPr id="82946" name="Rectangle 2"/>
+          <p:cNvSpPr>
+            <a:spLocks noGrp="1" noChangeArrowheads="1"/>
+          </p:cNvSpPr>
+          <p:nvPr>
+            <p:ph type="title"/>
+          </p:nvPr>
+        </p:nvSpPr>
+        <p:spPr/>
+        <p:txBody>
+          <a:bodyPr/>
+          <a:lstStyle/>
+          <a:p>
+            <a:r>
+              <a:rPr lang="en-US"/>
+              <a:t>Dangling else ambiguity</a:t>
+            </a:r>
+          </a:p>
+        </p:txBody>
+      </p:sp>
+      <p:sp>
+        <p:nvSpPr>
+          <p:cNvPr id="82947" name="Rectangle 3"/>
+          <p:cNvSpPr>
+            <a:spLocks noGrp="1" noChangeArrowheads="1"/>
+          </p:cNvSpPr>
+          <p:nvPr>
+            <p:ph idx="1"/>
+          </p:nvPr>
+        </p:nvSpPr>
+        <p:spPr/>
+        <p:txBody>
+          <a:bodyPr/>
+          <a:lstStyle/>
+          <a:p>
+            <a:pPr>
+              <a:lnSpc>
+                <a:spcPct val="90000"/>
+              </a:lnSpc>
+            </a:pPr>
+            <a:r>
+              <a:rPr lang="en-US" dirty="0">
+                <a:sym typeface="Symbol" charset="2"/>
+              </a:rPr>
+              <a:t>Modified Grammar (check for ambiguity)</a:t>
+            </a:r>
+          </a:p>
+          <a:p>
+            <a:pPr lvl="1">
+              <a:lnSpc>
+                <a:spcPct val="90000"/>
+              </a:lnSpc>
+              <a:buFontTx/>
+              <a:buNone/>
+            </a:pPr>
+            <a:r>
+              <a:rPr lang="en-US" sz="2400" dirty="0" err="1"/>
+              <a:t>Stmt</a:t>
+            </a:r>
+            <a:r>
+              <a:rPr lang="en-US" sz="2400" dirty="0"/>
+              <a:t> </a:t>
+            </a:r>
+            <a:r>
+              <a:rPr lang="en-US" sz="2400" b="1" dirty="0">
+                <a:sym typeface="Symbol" charset="2"/>
+              </a:rPr>
+              <a:t></a:t>
+            </a:r>
+            <a:r>
+              <a:rPr lang="en-US" sz="2400" dirty="0">
+                <a:sym typeface="Symbol" charset="2"/>
+              </a:rPr>
+              <a:t> </a:t>
+            </a:r>
+            <a:r>
+              <a:rPr lang="en-US" sz="2400" dirty="0" err="1">
+                <a:sym typeface="Symbol" charset="2"/>
+              </a:rPr>
+              <a:t>MatchedStmt</a:t>
+            </a:r>
+            <a:endParaRPr lang="en-US" sz="2400" dirty="0">
+              <a:sym typeface="Symbol" charset="2"/>
+            </a:endParaRPr>
+          </a:p>
+          <a:p>
+            <a:pPr lvl="1">
+              <a:lnSpc>
+                <a:spcPct val="90000"/>
+              </a:lnSpc>
+              <a:buNone/>
+            </a:pPr>
+            <a:r>
+              <a:rPr lang="en-US" sz="2400" dirty="0" err="1"/>
+              <a:t>Stmt</a:t>
+            </a:r>
+            <a:r>
+              <a:rPr lang="en-US" sz="2400" dirty="0"/>
+              <a:t> </a:t>
+            </a:r>
+            <a:r>
+              <a:rPr lang="en-US" sz="2400" b="1" dirty="0">
+                <a:sym typeface="Symbol" charset="2"/>
+              </a:rPr>
+              <a:t></a:t>
+            </a:r>
+            <a:r>
+              <a:rPr lang="en-US" sz="2400" dirty="0">
+                <a:sym typeface="Symbol" charset="2"/>
+              </a:rPr>
+              <a:t> </a:t>
+            </a:r>
+            <a:r>
+              <a:rPr lang="en-US" sz="2400" dirty="0" err="1">
+                <a:sym typeface="Symbol" charset="2"/>
+              </a:rPr>
+              <a:t>UnmatchedStmt</a:t>
+            </a:r>
+            <a:endParaRPr lang="en-US" sz="2400" dirty="0">
+              <a:sym typeface="Symbol" charset="2"/>
+            </a:endParaRPr>
+          </a:p>
+          <a:p>
+            <a:pPr lvl="1">
+              <a:lnSpc>
+                <a:spcPct val="90000"/>
+              </a:lnSpc>
+              <a:buFontTx/>
+              <a:buNone/>
+            </a:pPr>
+            <a:r>
+              <a:rPr lang="en-US" sz="2400" dirty="0" err="1"/>
+              <a:t>MatchedStmt</a:t>
+            </a:r>
+            <a:r>
+              <a:rPr lang="en-US" sz="2400" dirty="0"/>
+              <a:t> </a:t>
+            </a:r>
+            <a:r>
+              <a:rPr lang="en-US" sz="2400" b="1" dirty="0">
+                <a:sym typeface="Symbol" charset="2"/>
+              </a:rPr>
+              <a:t></a:t>
+            </a:r>
+            <a:r>
+              <a:rPr lang="en-US" sz="2400" dirty="0">
+                <a:sym typeface="Symbol" charset="2"/>
+              </a:rPr>
+              <a:t> </a:t>
+            </a:r>
+            <a:r>
+              <a:rPr lang="en-US" sz="2400" b="1" dirty="0">
+                <a:solidFill>
+                  <a:schemeClr val="accent2"/>
+                </a:solidFill>
+                <a:sym typeface="Symbol" charset="2"/>
+              </a:rPr>
+              <a:t>if</a:t>
+            </a:r>
+            <a:r>
+              <a:rPr lang="en-US" sz="2400" dirty="0">
+                <a:sym typeface="Symbol" charset="2"/>
+              </a:rPr>
+              <a:t> Expr </a:t>
+            </a:r>
+            <a:r>
+              <a:rPr lang="en-US" sz="2400" b="1" dirty="0">
+                <a:solidFill>
+                  <a:schemeClr val="accent2"/>
+                </a:solidFill>
+                <a:sym typeface="Symbol" charset="2"/>
+              </a:rPr>
+              <a:t>then</a:t>
+            </a:r>
+            <a:r>
+              <a:rPr lang="en-US" sz="2400" dirty="0">
+                <a:sym typeface="Symbol" charset="2"/>
+              </a:rPr>
+              <a:t> </a:t>
+            </a:r>
+            <a:r>
+              <a:rPr lang="en-US" sz="2400" dirty="0" err="1">
+                <a:sym typeface="Symbol" charset="2"/>
+              </a:rPr>
+              <a:t>MatchedStmt</a:t>
+            </a:r>
+            <a:r>
+              <a:rPr lang="en-US" sz="2400" dirty="0">
+                <a:sym typeface="Symbol" charset="2"/>
+              </a:rPr>
+              <a:t> </a:t>
+            </a:r>
+            <a:r>
+              <a:rPr lang="en-US" sz="2400" b="1" dirty="0">
+                <a:solidFill>
+                  <a:schemeClr val="accent2"/>
+                </a:solidFill>
+                <a:sym typeface="Symbol" charset="2"/>
+              </a:rPr>
+              <a:t>else</a:t>
+            </a:r>
+            <a:r>
+              <a:rPr lang="en-US" sz="2400" dirty="0">
+                <a:sym typeface="Symbol" charset="2"/>
+              </a:rPr>
+              <a:t> </a:t>
+            </a:r>
+            <a:r>
+              <a:rPr lang="en-US" sz="2400" dirty="0" err="1">
+                <a:sym typeface="Symbol" charset="2"/>
+              </a:rPr>
+              <a:t>MatchedStmt</a:t>
+            </a:r>
+            <a:endParaRPr lang="en-US" sz="2400" dirty="0">
+              <a:sym typeface="Symbol" charset="2"/>
+            </a:endParaRPr>
+          </a:p>
+          <a:p>
+            <a:pPr lvl="1">
+              <a:lnSpc>
+                <a:spcPct val="90000"/>
+              </a:lnSpc>
+              <a:buFontTx/>
+              <a:buNone/>
+            </a:pPr>
+            <a:r>
+              <a:rPr lang="en-US" sz="2400" dirty="0" err="1"/>
+              <a:t>MatchedStmt</a:t>
+            </a:r>
+            <a:r>
+              <a:rPr lang="en-US" sz="2400" dirty="0"/>
+              <a:t> </a:t>
+            </a:r>
+            <a:r>
+              <a:rPr lang="en-US" sz="2400" b="1" dirty="0">
+                <a:sym typeface="Symbol" charset="2"/>
+              </a:rPr>
+              <a:t></a:t>
+            </a:r>
+            <a:r>
+              <a:rPr lang="en-US" sz="2400" dirty="0">
+                <a:sym typeface="Symbol" charset="2"/>
+              </a:rPr>
+              <a:t> Other</a:t>
+            </a:r>
+          </a:p>
+          <a:p>
+            <a:pPr lvl="1">
+              <a:lnSpc>
+                <a:spcPct val="90000"/>
+              </a:lnSpc>
+              <a:buNone/>
+            </a:pPr>
+            <a:r>
+              <a:rPr lang="en-US" sz="2400" dirty="0" err="1"/>
+              <a:t>UnmatchedStmt</a:t>
+            </a:r>
+            <a:r>
+              <a:rPr lang="en-US" sz="2400" dirty="0"/>
+              <a:t> </a:t>
+            </a:r>
+            <a:r>
+              <a:rPr lang="en-US" sz="2400" b="1" dirty="0">
+                <a:sym typeface="Symbol" charset="2"/>
+              </a:rPr>
+              <a:t></a:t>
+            </a:r>
+            <a:r>
+              <a:rPr lang="en-US" sz="2400" dirty="0">
+                <a:sym typeface="Symbol" charset="2"/>
+              </a:rPr>
+              <a:t> </a:t>
+            </a:r>
+            <a:r>
+              <a:rPr lang="en-US" sz="2400" b="1" dirty="0">
+                <a:solidFill>
+                  <a:schemeClr val="accent2"/>
+                </a:solidFill>
+                <a:sym typeface="Symbol" charset="2"/>
+              </a:rPr>
+              <a:t>if</a:t>
+            </a:r>
+            <a:r>
+              <a:rPr lang="en-US" sz="2400" b="1" dirty="0">
+                <a:sym typeface="Symbol" charset="2"/>
+              </a:rPr>
+              <a:t> </a:t>
+            </a:r>
+            <a:r>
+              <a:rPr lang="en-US" sz="2400" dirty="0">
+                <a:sym typeface="Symbol" charset="2"/>
+              </a:rPr>
+              <a:t>Expr </a:t>
+            </a:r>
+            <a:r>
+              <a:rPr lang="en-US" sz="2400" b="1" dirty="0">
+                <a:solidFill>
+                  <a:schemeClr val="accent2"/>
+                </a:solidFill>
+                <a:sym typeface="Symbol" charset="2"/>
+              </a:rPr>
+              <a:t>then</a:t>
+            </a:r>
+            <a:r>
+              <a:rPr lang="en-US" sz="2400" dirty="0">
+                <a:sym typeface="Symbol" charset="2"/>
+              </a:rPr>
+              <a:t> </a:t>
+            </a:r>
+            <a:r>
+              <a:rPr lang="en-US" sz="2400" dirty="0" err="1">
+                <a:sym typeface="Symbol" charset="2"/>
+              </a:rPr>
+              <a:t>Stmt</a:t>
+            </a:r>
+            <a:endParaRPr lang="en-US" sz="2400" dirty="0">
+              <a:sym typeface="Symbol" charset="2"/>
+            </a:endParaRPr>
+          </a:p>
+          <a:p>
+            <a:pPr lvl="1">
+              <a:lnSpc>
+                <a:spcPct val="90000"/>
+              </a:lnSpc>
+              <a:buNone/>
+            </a:pPr>
+            <a:r>
+              <a:rPr lang="en-US" sz="2400" dirty="0" err="1"/>
+              <a:t>UnmatchedStmt</a:t>
+            </a:r>
+            <a:r>
+              <a:rPr lang="en-US" sz="2400" dirty="0"/>
+              <a:t> </a:t>
+            </a:r>
+            <a:r>
+              <a:rPr lang="en-US" sz="2400" b="1" dirty="0">
+                <a:sym typeface="Symbol" charset="2"/>
+              </a:rPr>
+              <a:t></a:t>
+            </a:r>
+            <a:r>
+              <a:rPr lang="en-US" sz="2400" dirty="0">
+                <a:sym typeface="Symbol" charset="2"/>
+              </a:rPr>
+              <a:t> </a:t>
+            </a:r>
+            <a:r>
+              <a:rPr lang="en-US" sz="2400" b="1" dirty="0">
+                <a:solidFill>
+                  <a:schemeClr val="accent2"/>
+                </a:solidFill>
+                <a:sym typeface="Symbol" charset="2"/>
+              </a:rPr>
+              <a:t>if</a:t>
+            </a:r>
+            <a:r>
+              <a:rPr lang="en-US" sz="2400" dirty="0">
+                <a:sym typeface="Symbol" charset="2"/>
+              </a:rPr>
+              <a:t> Expr </a:t>
+            </a:r>
+            <a:r>
+              <a:rPr lang="en-US" sz="2400" b="1" dirty="0">
+                <a:solidFill>
+                  <a:schemeClr val="accent2"/>
+                </a:solidFill>
+                <a:sym typeface="Symbol" charset="2"/>
+              </a:rPr>
+              <a:t>then</a:t>
+            </a:r>
+            <a:r>
+              <a:rPr lang="en-US" sz="2400" dirty="0">
+                <a:sym typeface="Symbol" charset="2"/>
+              </a:rPr>
+              <a:t> </a:t>
+            </a:r>
+            <a:r>
+              <a:rPr lang="en-US" sz="2400" dirty="0" err="1">
+                <a:sym typeface="Symbol" charset="2"/>
+              </a:rPr>
+              <a:t>MatchedStmt</a:t>
+            </a:r>
+            <a:r>
+              <a:rPr lang="en-US" sz="2400" dirty="0">
+                <a:sym typeface="Symbol" charset="2"/>
+              </a:rPr>
+              <a:t> </a:t>
+            </a:r>
+            <a:r>
+              <a:rPr lang="en-US" sz="2400" b="1" dirty="0">
+                <a:solidFill>
+                  <a:schemeClr val="accent2"/>
+                </a:solidFill>
+                <a:sym typeface="Symbol" charset="2"/>
+              </a:rPr>
+              <a:t>else</a:t>
+            </a:r>
+            <a:r>
+              <a:rPr lang="en-US" sz="2400" dirty="0">
+                <a:sym typeface="Symbol" charset="2"/>
+              </a:rPr>
+              <a:t> </a:t>
+            </a:r>
+            <a:r>
+              <a:rPr lang="en-US" sz="2400" dirty="0" err="1">
+                <a:sym typeface="Symbol" charset="2"/>
+              </a:rPr>
+              <a:t>UnmatchedStmt</a:t>
+            </a:r>
+            <a:endParaRPr lang="en-US" sz="2400" dirty="0">
+              <a:sym typeface="Symbol" charset="2"/>
+            </a:endParaRPr>
+          </a:p>
+          <a:p>
+            <a:pPr lvl="1">
+              <a:lnSpc>
+                <a:spcPct val="90000"/>
+              </a:lnSpc>
+              <a:buNone/>
+            </a:pPr>
+            <a:endParaRPr lang="en-US" sz="2400" dirty="0">
+              <a:sym typeface="Symbol" charset="2"/>
+            </a:endParaRPr>
+          </a:p>
+          <a:p>
+            <a:pPr lvl="1">
+              <a:lnSpc>
+                <a:spcPct val="90000"/>
+              </a:lnSpc>
+              <a:buFontTx/>
+              <a:buNone/>
+            </a:pPr>
+            <a:endParaRPr lang="en-US" sz="2400" dirty="0">
+              <a:sym typeface="Symbol" charset="2"/>
+            </a:endParaRPr>
+          </a:p>
+        </p:txBody>
+      </p:sp>
+      <p:sp>
+        <p:nvSpPr>
+          <p:cNvPr id="5" name="Slide Number Placeholder 5"/>
+          <p:cNvSpPr>
+            <a:spLocks noGrp="1"/>
+          </p:cNvSpPr>
+          <p:nvPr>
+            <p:ph type="sldNum" sz="quarter" idx="12"/>
+          </p:nvPr>
+        </p:nvSpPr>
+        <p:spPr/>
+        <p:txBody>
+          <a:bodyPr/>
+          <a:lstStyle/>
+          <a:p>
+            <a:fld id="{106DC36A-F5D5-4F42-8A37-D23009BFA5B0}" type="slidenum">
+              <a:rPr lang="en-US"/>
+              <a:pPr/>
+              <a:t>20</a:t>
+            </a:fld>
+            <a:endParaRPr lang="en-US"/>
+          </a:p>
+        </p:txBody>
+      </p:sp>
+    </p:spTree>
+    <p:extLst>
+      <p:ext uri="{BB962C8B-B14F-4D97-AF65-F5344CB8AC3E}">
+        <p14:creationId xmlns:p14="http://schemas.microsoft.com/office/powerpoint/2010/main" val="3270708205"/>
+      </p:ext>
+    </p:extLst>
+  </p:cSld>
+  <p:clrMapOvr>
+    <a:masterClrMapping/>
+  </p:clrMapOvr>
+  <p:timing>
+    <p:tnLst>
+      <p:par>
+        <p:cTn id="1" dur="indefinite" restart="never" nodeType="tmRoot">
+          <p:childTnLst>
+            <p:seq concurrent="1" nextAc="seek">
+              <p:cTn id="2" dur="indefinite" nodeType="mainSeq">
+                <p:childTnLst>
+                  <p:par>
+                    <p:cTn id="3" fill="hold">
+                      <p:stCondLst>
+                        <p:cond delay="indefinite"/>
+                      </p:stCondLst>
+                      <p:childTnLst>
+                        <p:par>
+                          <p:cTn id="4" fill="hold">
+                            <p:stCondLst>
+                              <p:cond delay="0"/>
+                            </p:stCondLst>
+                            <p:childTnLst>
+                              <p:par>
+                                <p:cTn id="5" presetID="1" presetClass="entr" presetSubtype="0" fill="hold" grpId="0" nodeType="clickEffect">
+                                  <p:stCondLst>
+                                    <p:cond delay="0"/>
+                                  </p:stCondLst>
+                                  <p:childTnLst>
+                                    <p:set>
+                                      <p:cBhvr>
+                                        <p:cTn id="6" dur="1" fill="hold">
+                                          <p:stCondLst>
+                                            <p:cond delay="499"/>
+                                          </p:stCondLst>
+                                        </p:cTn>
+                                        <p:tgtEl>
+                                          <p:spTgt spid="82947">
+                                            <p:txEl>
+                                              <p:pRg st="0" end="0"/>
+                                            </p:txEl>
+                                          </p:spTgt>
+                                        </p:tgtEl>
+                                        <p:attrNameLst>
+                                          <p:attrName>style.visibility</p:attrName>
+                                        </p:attrNameLst>
+                                      </p:cBhvr>
+                                      <p:to>
+                                        <p:strVal val="visible"/>
+                                      </p:to>
+                                    </p:set>
+                                  </p:childTnLst>
+                                </p:cTn>
+                              </p:par>
+                              <p:par>
+                                <p:cTn id="7" presetID="1" presetClass="entr" presetSubtype="0" fill="hold" grpId="0" nodeType="withEffect">
+                                  <p:stCondLst>
+                                    <p:cond delay="0"/>
+                                  </p:stCondLst>
+                                  <p:childTnLst>
+                                    <p:set>
+                                      <p:cBhvr>
+                                        <p:cTn id="8" dur="1" fill="hold">
+                                          <p:stCondLst>
+                                            <p:cond delay="499"/>
+                                          </p:stCondLst>
+                                        </p:cTn>
+                                        <p:tgtEl>
+                                          <p:spTgt spid="82947">
+                                            <p:txEl>
+                                              <p:pRg st="1" end="1"/>
+                                            </p:txEl>
+                                          </p:spTgt>
+                                        </p:tgtEl>
+                                        <p:attrNameLst>
+                                          <p:attrName>style.visibility</p:attrName>
+                                        </p:attrNameLst>
+                                      </p:cBhvr>
+                                      <p:to>
+                                        <p:strVal val="visible"/>
+                                      </p:to>
+                                    </p:set>
+                                  </p:childTnLst>
+                                </p:cTn>
+                              </p:par>
+                              <p:par>
+                                <p:cTn id="9" presetID="1" presetClass="entr" presetSubtype="0" fill="hold" grpId="0" nodeType="withEffect">
+                                  <p:stCondLst>
+                                    <p:cond delay="0"/>
+                                  </p:stCondLst>
+                                  <p:childTnLst>
+                                    <p:set>
+                                      <p:cBhvr>
+                                        <p:cTn id="10" dur="1" fill="hold">
+                                          <p:stCondLst>
+                                            <p:cond delay="499"/>
+                                          </p:stCondLst>
+                                        </p:cTn>
+                                        <p:tgtEl>
+                                          <p:spTgt spid="82947">
+                                            <p:txEl>
+                                              <p:pRg st="2" end="2"/>
+                                            </p:txEl>
+                                          </p:spTgt>
+                                        </p:tgtEl>
+                                        <p:attrNameLst>
+                                          <p:attrName>style.visibility</p:attrName>
+                                        </p:attrNameLst>
+                                      </p:cBhvr>
+                                      <p:to>
+                                        <p:strVal val="visible"/>
+                                      </p:to>
+                                    </p:set>
+                                  </p:childTnLst>
+                                </p:cTn>
+                              </p:par>
+                              <p:par>
+                                <p:cTn id="11" presetID="1" presetClass="entr" presetSubtype="0" fill="hold" grpId="0" nodeType="withEffect">
+                                  <p:stCondLst>
+                                    <p:cond delay="0"/>
+                                  </p:stCondLst>
+                                  <p:childTnLst>
+                                    <p:set>
+                                      <p:cBhvr>
+                                        <p:cTn id="12" dur="1" fill="hold">
+                                          <p:stCondLst>
+                                            <p:cond delay="499"/>
+                                          </p:stCondLst>
+                                        </p:cTn>
+                                        <p:tgtEl>
+                                          <p:spTgt spid="82947">
+                                            <p:txEl>
+                                              <p:pRg st="3" end="3"/>
+                                            </p:txEl>
+                                          </p:spTgt>
+                                        </p:tgtEl>
+                                        <p:attrNameLst>
+                                          <p:attrName>style.visibility</p:attrName>
+                                        </p:attrNameLst>
+                                      </p:cBhvr>
+                                      <p:to>
+                                        <p:strVal val="visible"/>
+                                      </p:to>
+                                    </p:set>
+                                  </p:childTnLst>
+                                </p:cTn>
+                              </p:par>
+                              <p:par>
+                                <p:cTn id="13" presetID="1" presetClass="entr" presetSubtype="0" fill="hold" grpId="0" nodeType="withEffect">
+                                  <p:stCondLst>
+                                    <p:cond delay="0"/>
+                                  </p:stCondLst>
+                                  <p:childTnLst>
+                                    <p:set>
+                                      <p:cBhvr>
+                                        <p:cTn id="14" dur="1" fill="hold">
+                                          <p:stCondLst>
+                                            <p:cond delay="499"/>
+                                          </p:stCondLst>
+                                        </p:cTn>
+                                        <p:tgtEl>
+                                          <p:spTgt spid="82947">
+                                            <p:txEl>
+                                              <p:pRg st="4" end="4"/>
+                                            </p:txEl>
+                                          </p:spTgt>
+                                        </p:tgtEl>
+                                        <p:attrNameLst>
+                                          <p:attrName>style.visibility</p:attrName>
+                                        </p:attrNameLst>
+                                      </p:cBhvr>
+                                      <p:to>
+                                        <p:strVal val="visible"/>
+                                      </p:to>
+                                    </p:set>
+                                  </p:childTnLst>
+                                </p:cTn>
+                              </p:par>
+                              <p:par>
+                                <p:cTn id="15" presetID="1" presetClass="entr" presetSubtype="0" fill="hold" grpId="0" nodeType="withEffect">
+                                  <p:stCondLst>
+                                    <p:cond delay="0"/>
+                                  </p:stCondLst>
+                                  <p:childTnLst>
+                                    <p:set>
+                                      <p:cBhvr>
+                                        <p:cTn id="16" dur="1" fill="hold">
+                                          <p:stCondLst>
+                                            <p:cond delay="499"/>
+                                          </p:stCondLst>
+                                        </p:cTn>
+                                        <p:tgtEl>
+                                          <p:spTgt spid="82947">
+                                            <p:txEl>
+                                              <p:pRg st="5" end="5"/>
+                                            </p:txEl>
+                                          </p:spTgt>
+                                        </p:tgtEl>
+                                        <p:attrNameLst>
+                                          <p:attrName>style.visibility</p:attrName>
+                                        </p:attrNameLst>
+                                      </p:cBhvr>
+                                      <p:to>
+                                        <p:strVal val="visible"/>
+                                      </p:to>
+                                    </p:set>
+                                  </p:childTnLst>
+                                </p:cTn>
+                              </p:par>
+                              <p:par>
+                                <p:cTn id="17" presetID="1" presetClass="entr" presetSubtype="0" fill="hold" grpId="0" nodeType="withEffect">
+                                  <p:stCondLst>
+                                    <p:cond delay="0"/>
+                                  </p:stCondLst>
+                                  <p:childTnLst>
+                                    <p:set>
+                                      <p:cBhvr>
+                                        <p:cTn id="18" dur="1" fill="hold">
+                                          <p:stCondLst>
+                                            <p:cond delay="499"/>
+                                          </p:stCondLst>
+                                        </p:cTn>
+                                        <p:tgtEl>
+                                          <p:spTgt spid="82947">
+                                            <p:txEl>
+                                              <p:pRg st="6" end="6"/>
+                                            </p:txEl>
+                                          </p:spTgt>
+                                        </p:tgtEl>
+                                        <p:attrNameLst>
+                                          <p:attrName>style.visibility</p:attrName>
+                                        </p:attrNameLst>
+                                      </p:cBhvr>
+                                      <p:to>
+                                        <p:strVal val="visible"/>
+                                      </p:to>
+                                    </p:set>
+                                  </p:childTnLst>
+                                </p:cTn>
+                              </p:par>
+                            </p:childTnLst>
+                          </p:cTn>
+                        </p:par>
+                      </p:childTnLst>
+                    </p:cTn>
+                  </p:par>
+                </p:childTnLst>
+              </p:cTn>
+              <p:prevCondLst>
+                <p:cond evt="onPrev" delay="0">
+                  <p:tgtEl>
+                    <p:sldTgt/>
+                  </p:tgtEl>
+                </p:cond>
+              </p:prevCondLst>
+              <p:nextCondLst>
+                <p:cond evt="onNext" delay="0">
+                  <p:tgtEl>
+                    <p:sldTgt/>
+                  </p:tgtEl>
+                </p:cond>
+              </p:nextCondLst>
+            </p:seq>
+          </p:childTnLst>
+        </p:cTn>
+      </p:par>
+    </p:tnLst>
+    <p:bldLst>
+      <p:bldP spid="82947" grpId="0" build="p" autoUpdateAnimBg="0"/>
+    </p:bldLst>
   </p:timing>
 </p:sld>
 </file>
@@ -22190,8 +23127,8 @@
           </a:p>
         </p:txBody>
       </p:sp>
-      <mc:AlternateContent xmlns:mc="http://schemas.openxmlformats.org/markup-compatibility/2006">
-        <mc:Choice xmlns:a14="http://schemas.microsoft.com/office/drawing/2010/main" Requires="a14">
+      <mc:AlternateContent xmlns:mc="http://schemas.openxmlformats.org/markup-compatibility/2006" xmlns:a14="http://schemas.microsoft.com/office/drawing/2010/main">
+        <mc:Choice Requires="a14">
           <p:sp>
             <p:nvSpPr>
               <p:cNvPr id="3" name="Content Placeholder 2"/>
@@ -22601,7 +23538,7 @@
             </p:txBody>
           </p:sp>
         </mc:Choice>
-        <mc:Fallback>
+        <mc:Fallback xmlns="">
           <p:sp>
             <p:nvSpPr>
               <p:cNvPr id="3" name="Content Placeholder 2"/>
@@ -23560,15 +24497,7 @@
             </a:pPr>
             <a:r>
               <a:rPr lang="en-US" dirty="0"/>
-              <a:t>Original Grammar (</a:t>
-            </a:r>
-            <a:r>
-              <a:rPr lang="en-US" dirty="0" err="1"/>
-              <a:t>amibguous</a:t>
-            </a:r>
-            <a:r>
-              <a:rPr lang="en-US" dirty="0"/>
-              <a:t>)</a:t>
+              <a:t>Original Grammar (ambiguous)</a:t>
             </a:r>
           </a:p>
           <a:p>

</xml_diff>